<commit_message>
Chap 03: end of corrections. Last two paragraphs and conclusion to check again.
</commit_message>
<xml_diff>
--- a/03-h-Mn/Pictures/LevelSplitB.pptx
+++ b/03-h-Mn/Pictures/LevelSplitB.pptx
@@ -10,7 +10,7 @@
   <p:sldIdLst>
     <p:sldId id="293" r:id="rId2"/>
   </p:sldIdLst>
-  <p:sldSz cx="6858000" cy="8029575"/>
+  <p:sldSz cx="4068763" cy="8029575"/>
   <p:notesSz cx="6797675" cy="9926638"/>
   <p:defaultTextStyle>
     <a:defPPr>
@@ -192,7 +192,7 @@
           <a:p>
             <a:fld id="{A732596A-CC33-44AB-A517-CD91BCF05E15}" type="datetimeFigureOut">
               <a:rPr lang="en-US" smtClean="0"/>
-              <a:t>7/13/2017</a:t>
+              <a:t>9/21/2017</a:t>
             </a:fld>
             <a:endParaRPr lang="en-US"/>
           </a:p>
@@ -210,8 +210,8 @@
         </p:nvSpPr>
         <p:spPr>
           <a:xfrm>
-            <a:off x="1811338" y="744538"/>
-            <a:ext cx="3175000" cy="3721100"/>
+            <a:off x="2455863" y="744538"/>
+            <a:ext cx="1885950" cy="3721100"/>
           </a:xfrm>
           <a:prstGeom prst="rect">
             <a:avLst/>
@@ -460,6 +460,95 @@
 </p:notesMaster>
 </file>
 
+<file path=ppt/notesSlides/notesSlide1.xml><?xml version="1.0" encoding="utf-8"?>
+<p:notes xmlns:a="http://schemas.openxmlformats.org/drawingml/2006/main" xmlns:r="http://schemas.openxmlformats.org/officeDocument/2006/relationships" xmlns:p="http://schemas.openxmlformats.org/presentationml/2006/main">
+  <p:cSld>
+    <p:spTree>
+      <p:nvGrpSpPr>
+        <p:cNvPr id="1" name=""/>
+        <p:cNvGrpSpPr/>
+        <p:nvPr/>
+      </p:nvGrpSpPr>
+      <p:grpSpPr>
+        <a:xfrm>
+          <a:off x="0" y="0"/>
+          <a:ext cx="0" cy="0"/>
+          <a:chOff x="0" y="0"/>
+          <a:chExt cx="0" cy="0"/>
+        </a:xfrm>
+      </p:grpSpPr>
+      <p:sp>
+        <p:nvSpPr>
+          <p:cNvPr id="2" name="Espace réservé de l'image des diapositives 1"/>
+          <p:cNvSpPr>
+            <a:spLocks noGrp="1" noRot="1" noChangeAspect="1"/>
+          </p:cNvSpPr>
+          <p:nvPr>
+            <p:ph type="sldImg"/>
+          </p:nvPr>
+        </p:nvSpPr>
+        <p:spPr>
+          <a:xfrm>
+            <a:off x="2455863" y="744538"/>
+            <a:ext cx="1885950" cy="3721100"/>
+          </a:xfrm>
+        </p:spPr>
+      </p:sp>
+      <p:sp>
+        <p:nvSpPr>
+          <p:cNvPr id="3" name="Espace réservé des commentaires 2"/>
+          <p:cNvSpPr>
+            <a:spLocks noGrp="1"/>
+          </p:cNvSpPr>
+          <p:nvPr>
+            <p:ph type="body" idx="1"/>
+          </p:nvPr>
+        </p:nvSpPr>
+        <p:spPr/>
+        <p:txBody>
+          <a:bodyPr/>
+          <a:lstStyle/>
+          <a:p>
+            <a:endParaRPr lang="fr-FR" dirty="0"/>
+          </a:p>
+        </p:txBody>
+      </p:sp>
+      <p:sp>
+        <p:nvSpPr>
+          <p:cNvPr id="4" name="Espace réservé du numéro de diapositive 3"/>
+          <p:cNvSpPr>
+            <a:spLocks noGrp="1"/>
+          </p:cNvSpPr>
+          <p:nvPr>
+            <p:ph type="sldNum" sz="quarter" idx="10"/>
+          </p:nvPr>
+        </p:nvSpPr>
+        <p:spPr/>
+        <p:txBody>
+          <a:bodyPr/>
+          <a:lstStyle/>
+          <a:p>
+            <a:fld id="{062323BE-C712-422A-9927-239FDB892797}" type="slidenum">
+              <a:rPr lang="en-US" smtClean="0"/>
+              <a:t>1</a:t>
+            </a:fld>
+            <a:endParaRPr lang="en-US"/>
+          </a:p>
+        </p:txBody>
+      </p:sp>
+    </p:spTree>
+    <p:extLst>
+      <p:ext uri="{BB962C8B-B14F-4D97-AF65-F5344CB8AC3E}">
+        <p14:creationId xmlns:p14="http://schemas.microsoft.com/office/powerpoint/2010/main" val="1906864929"/>
+      </p:ext>
+    </p:extLst>
+  </p:cSld>
+  <p:clrMapOvr>
+    <a:masterClrMapping/>
+  </p:clrMapOvr>
+</p:notes>
+</file>
+
 <file path=ppt/slideLayouts/slideLayout1.xml><?xml version="1.0" encoding="utf-8"?>
 <p:sldLayout xmlns:a="http://schemas.openxmlformats.org/drawingml/2006/main" xmlns:r="http://schemas.openxmlformats.org/officeDocument/2006/relationships" xmlns:p="http://schemas.openxmlformats.org/presentationml/2006/main" type="title" preserve="1">
   <p:cSld name="Diapositive de titre">
@@ -489,8 +578,8 @@
         </p:nvSpPr>
         <p:spPr>
           <a:xfrm>
-            <a:off x="514350" y="2494375"/>
-            <a:ext cx="5829300" cy="1721154"/>
+            <a:off x="305158" y="2494375"/>
+            <a:ext cx="3458450" cy="1721154"/>
           </a:xfrm>
         </p:spPr>
         <p:txBody>
@@ -517,8 +606,8 @@
         </p:nvSpPr>
         <p:spPr>
           <a:xfrm>
-            <a:off x="1028700" y="4550093"/>
-            <a:ext cx="4800600" cy="2052003"/>
+            <a:off x="610316" y="4550097"/>
+            <a:ext cx="2848134" cy="2052003"/>
           </a:xfrm>
         </p:spPr>
         <p:txBody>
@@ -641,7 +730,7 @@
           <a:p>
             <a:fld id="{252CF840-51FB-49D9-ADDC-0C52DA34DC77}" type="datetimeFigureOut">
               <a:rPr lang="en-US" smtClean="0"/>
-              <a:t>7/13/2017</a:t>
+              <a:t>9/21/2017</a:t>
             </a:fld>
             <a:endParaRPr lang="en-US"/>
           </a:p>
@@ -811,7 +900,7 @@
           <a:p>
             <a:fld id="{252CF840-51FB-49D9-ADDC-0C52DA34DC77}" type="datetimeFigureOut">
               <a:rPr lang="en-US" smtClean="0"/>
-              <a:t>7/13/2017</a:t>
+              <a:t>9/21/2017</a:t>
             </a:fld>
             <a:endParaRPr lang="en-US"/>
           </a:p>
@@ -901,8 +990,8 @@
         </p:nvSpPr>
         <p:spPr>
           <a:xfrm>
-            <a:off x="4972050" y="321558"/>
-            <a:ext cx="1543050" cy="6851160"/>
+            <a:off x="2949854" y="321558"/>
+            <a:ext cx="915472" cy="6851160"/>
           </a:xfrm>
         </p:spPr>
         <p:txBody>
@@ -929,8 +1018,8 @@
         </p:nvSpPr>
         <p:spPr>
           <a:xfrm>
-            <a:off x="342900" y="321558"/>
-            <a:ext cx="4514850" cy="6851160"/>
+            <a:off x="203439" y="321558"/>
+            <a:ext cx="2678602" cy="6851160"/>
           </a:xfrm>
         </p:spPr>
         <p:txBody>
@@ -991,7 +1080,7 @@
           <a:p>
             <a:fld id="{252CF840-51FB-49D9-ADDC-0C52DA34DC77}" type="datetimeFigureOut">
               <a:rPr lang="en-US" smtClean="0"/>
-              <a:t>7/13/2017</a:t>
+              <a:t>9/21/2017</a:t>
             </a:fld>
             <a:endParaRPr lang="en-US"/>
           </a:p>
@@ -1161,7 +1250,7 @@
           <a:p>
             <a:fld id="{252CF840-51FB-49D9-ADDC-0C52DA34DC77}" type="datetimeFigureOut">
               <a:rPr lang="en-US" smtClean="0"/>
-              <a:t>7/13/2017</a:t>
+              <a:t>9/21/2017</a:t>
             </a:fld>
             <a:endParaRPr lang="en-US"/>
           </a:p>
@@ -1251,8 +1340,8 @@
         </p:nvSpPr>
         <p:spPr>
           <a:xfrm>
-            <a:off x="541735" y="5159746"/>
-            <a:ext cx="5829300" cy="1594764"/>
+            <a:off x="321405" y="5159746"/>
+            <a:ext cx="3458450" cy="1594764"/>
           </a:xfrm>
         </p:spPr>
         <p:txBody>
@@ -1283,8 +1372,8 @@
         </p:nvSpPr>
         <p:spPr>
           <a:xfrm>
-            <a:off x="541735" y="3403277"/>
-            <a:ext cx="5829300" cy="1756469"/>
+            <a:off x="321405" y="3403281"/>
+            <a:ext cx="3458450" cy="1756469"/>
           </a:xfrm>
         </p:spPr>
         <p:txBody>
@@ -1407,7 +1496,7 @@
           <a:p>
             <a:fld id="{252CF840-51FB-49D9-ADDC-0C52DA34DC77}" type="datetimeFigureOut">
               <a:rPr lang="en-US" smtClean="0"/>
-              <a:t>7/13/2017</a:t>
+              <a:t>9/21/2017</a:t>
             </a:fld>
             <a:endParaRPr lang="en-US"/>
           </a:p>
@@ -1520,8 +1609,8 @@
         </p:nvSpPr>
         <p:spPr>
           <a:xfrm>
-            <a:off x="342900" y="1873568"/>
-            <a:ext cx="3028950" cy="5299148"/>
+            <a:off x="203439" y="1873568"/>
+            <a:ext cx="1797037" cy="5299148"/>
           </a:xfrm>
         </p:spPr>
         <p:txBody>
@@ -1605,8 +1694,8 @@
         </p:nvSpPr>
         <p:spPr>
           <a:xfrm>
-            <a:off x="3486150" y="1873568"/>
-            <a:ext cx="3028950" cy="5299148"/>
+            <a:off x="2068289" y="1873568"/>
+            <a:ext cx="1797037" cy="5299148"/>
           </a:xfrm>
         </p:spPr>
         <p:txBody>
@@ -1695,7 +1784,7 @@
           <a:p>
             <a:fld id="{252CF840-51FB-49D9-ADDC-0C52DA34DC77}" type="datetimeFigureOut">
               <a:rPr lang="en-US" smtClean="0"/>
-              <a:t>7/13/2017</a:t>
+              <a:t>9/21/2017</a:t>
             </a:fld>
             <a:endParaRPr lang="en-US"/>
           </a:p>
@@ -1812,8 +1901,8 @@
         </p:nvSpPr>
         <p:spPr>
           <a:xfrm>
-            <a:off x="342900" y="1797362"/>
-            <a:ext cx="3030141" cy="749055"/>
+            <a:off x="203440" y="1797366"/>
+            <a:ext cx="1797743" cy="749055"/>
           </a:xfrm>
         </p:spPr>
         <p:txBody>
@@ -1877,8 +1966,8 @@
         </p:nvSpPr>
         <p:spPr>
           <a:xfrm>
-            <a:off x="342900" y="2546415"/>
-            <a:ext cx="3030141" cy="4626300"/>
+            <a:off x="203440" y="2546415"/>
+            <a:ext cx="1797743" cy="4626300"/>
           </a:xfrm>
         </p:spPr>
         <p:txBody>
@@ -1962,8 +2051,8 @@
         </p:nvSpPr>
         <p:spPr>
           <a:xfrm>
-            <a:off x="3483773" y="1797362"/>
-            <a:ext cx="3031331" cy="749055"/>
+            <a:off x="2066878" y="1797366"/>
+            <a:ext cx="1798450" cy="749055"/>
           </a:xfrm>
         </p:spPr>
         <p:txBody>
@@ -2027,8 +2116,8 @@
         </p:nvSpPr>
         <p:spPr>
           <a:xfrm>
-            <a:off x="3483773" y="2546415"/>
-            <a:ext cx="3031331" cy="4626300"/>
+            <a:off x="2066878" y="2546415"/>
+            <a:ext cx="1798450" cy="4626300"/>
           </a:xfrm>
         </p:spPr>
         <p:txBody>
@@ -2117,7 +2206,7 @@
           <a:p>
             <a:fld id="{252CF840-51FB-49D9-ADDC-0C52DA34DC77}" type="datetimeFigureOut">
               <a:rPr lang="en-US" smtClean="0"/>
-              <a:t>7/13/2017</a:t>
+              <a:t>9/21/2017</a:t>
             </a:fld>
             <a:endParaRPr lang="en-US"/>
           </a:p>
@@ -2235,7 +2324,7 @@
           <a:p>
             <a:fld id="{252CF840-51FB-49D9-ADDC-0C52DA34DC77}" type="datetimeFigureOut">
               <a:rPr lang="en-US" smtClean="0"/>
-              <a:t>7/13/2017</a:t>
+              <a:t>9/21/2017</a:t>
             </a:fld>
             <a:endParaRPr lang="en-US"/>
           </a:p>
@@ -2330,7 +2419,7 @@
           <a:p>
             <a:fld id="{252CF840-51FB-49D9-ADDC-0C52DA34DC77}" type="datetimeFigureOut">
               <a:rPr lang="en-US" smtClean="0"/>
-              <a:t>7/13/2017</a:t>
+              <a:t>9/21/2017</a:t>
             </a:fld>
             <a:endParaRPr lang="en-US"/>
           </a:p>
@@ -2420,8 +2509,8 @@
         </p:nvSpPr>
         <p:spPr>
           <a:xfrm>
-            <a:off x="342904" y="319698"/>
-            <a:ext cx="2256235" cy="1360566"/>
+            <a:off x="203442" y="319698"/>
+            <a:ext cx="1338595" cy="1360566"/>
           </a:xfrm>
         </p:spPr>
         <p:txBody>
@@ -2452,8 +2541,8 @@
         </p:nvSpPr>
         <p:spPr>
           <a:xfrm>
-            <a:off x="2681291" y="319697"/>
-            <a:ext cx="3833813" cy="6853021"/>
+            <a:off x="1590776" y="319701"/>
+            <a:ext cx="2274552" cy="6853021"/>
           </a:xfrm>
         </p:spPr>
         <p:txBody>
@@ -2537,8 +2626,8 @@
         </p:nvSpPr>
         <p:spPr>
           <a:xfrm>
-            <a:off x="342904" y="1680264"/>
-            <a:ext cx="2256235" cy="5492452"/>
+            <a:off x="203442" y="1680264"/>
+            <a:ext cx="1338595" cy="5492452"/>
           </a:xfrm>
         </p:spPr>
         <p:txBody>
@@ -2607,7 +2696,7 @@
           <a:p>
             <a:fld id="{252CF840-51FB-49D9-ADDC-0C52DA34DC77}" type="datetimeFigureOut">
               <a:rPr lang="en-US" smtClean="0"/>
-              <a:t>7/13/2017</a:t>
+              <a:t>9/21/2017</a:t>
             </a:fld>
             <a:endParaRPr lang="en-US"/>
           </a:p>
@@ -2697,8 +2786,8 @@
         </p:nvSpPr>
         <p:spPr>
           <a:xfrm>
-            <a:off x="1344216" y="5620704"/>
-            <a:ext cx="4114800" cy="663555"/>
+            <a:off x="797506" y="5620708"/>
+            <a:ext cx="2441258" cy="663555"/>
           </a:xfrm>
         </p:spPr>
         <p:txBody>
@@ -2729,8 +2818,8 @@
         </p:nvSpPr>
         <p:spPr>
           <a:xfrm>
-            <a:off x="1344216" y="717458"/>
-            <a:ext cx="4114800" cy="4817745"/>
+            <a:off x="797506" y="717462"/>
+            <a:ext cx="2441258" cy="4817745"/>
           </a:xfrm>
         </p:spPr>
         <p:txBody>
@@ -2790,8 +2879,8 @@
         </p:nvSpPr>
         <p:spPr>
           <a:xfrm>
-            <a:off x="1344216" y="6284259"/>
-            <a:ext cx="4114800" cy="942359"/>
+            <a:off x="797506" y="6284263"/>
+            <a:ext cx="2441258" cy="942359"/>
           </a:xfrm>
         </p:spPr>
         <p:txBody>
@@ -2860,7 +2949,7 @@
           <a:p>
             <a:fld id="{252CF840-51FB-49D9-ADDC-0C52DA34DC77}" type="datetimeFigureOut">
               <a:rPr lang="en-US" smtClean="0"/>
-              <a:t>7/13/2017</a:t>
+              <a:t>9/21/2017</a:t>
             </a:fld>
             <a:endParaRPr lang="en-US"/>
           </a:p>
@@ -2955,8 +3044,8 @@
         </p:nvSpPr>
         <p:spPr>
           <a:xfrm>
-            <a:off x="342900" y="321556"/>
-            <a:ext cx="6172200" cy="1338263"/>
+            <a:off x="203440" y="321560"/>
+            <a:ext cx="3661887" cy="1338263"/>
           </a:xfrm>
           <a:prstGeom prst="rect">
             <a:avLst/>
@@ -2988,8 +3077,8 @@
         </p:nvSpPr>
         <p:spPr>
           <a:xfrm>
-            <a:off x="342900" y="1873568"/>
-            <a:ext cx="6172200" cy="5299148"/>
+            <a:off x="203440" y="1873568"/>
+            <a:ext cx="3661887" cy="5299148"/>
           </a:xfrm>
           <a:prstGeom prst="rect">
             <a:avLst/>
@@ -3050,8 +3139,8 @@
         </p:nvSpPr>
         <p:spPr>
           <a:xfrm>
-            <a:off x="342900" y="7442228"/>
-            <a:ext cx="1600200" cy="427501"/>
+            <a:off x="203440" y="7442232"/>
+            <a:ext cx="949378" cy="427501"/>
           </a:xfrm>
           <a:prstGeom prst="rect">
             <a:avLst/>
@@ -3073,7 +3162,7 @@
           <a:p>
             <a:fld id="{252CF840-51FB-49D9-ADDC-0C52DA34DC77}" type="datetimeFigureOut">
               <a:rPr lang="en-US" smtClean="0"/>
-              <a:t>7/13/2017</a:t>
+              <a:t>9/21/2017</a:t>
             </a:fld>
             <a:endParaRPr lang="en-US"/>
           </a:p>
@@ -3091,8 +3180,8 @@
         </p:nvSpPr>
         <p:spPr>
           <a:xfrm>
-            <a:off x="2343150" y="7442228"/>
-            <a:ext cx="2171700" cy="427501"/>
+            <a:off x="1390162" y="7442232"/>
+            <a:ext cx="1288442" cy="427501"/>
           </a:xfrm>
           <a:prstGeom prst="rect">
             <a:avLst/>
@@ -3128,8 +3217,8 @@
         </p:nvSpPr>
         <p:spPr>
           <a:xfrm>
-            <a:off x="4914900" y="7442228"/>
-            <a:ext cx="1600200" cy="427501"/>
+            <a:off x="2915949" y="7442232"/>
+            <a:ext cx="949378" cy="427501"/>
           </a:xfrm>
           <a:prstGeom prst="rect">
             <a:avLst/>
@@ -3450,91 +3539,7 @@
       </p:grpSpPr>
       <p:pic>
         <p:nvPicPr>
-          <p:cNvPr id="79" name="Picture 2"/>
-          <p:cNvPicPr>
-            <a:picLocks noChangeAspect="1" noChangeArrowheads="1"/>
-          </p:cNvPicPr>
-          <p:nvPr/>
-        </p:nvPicPr>
-        <p:blipFill>
-          <a:blip r:embed="rId2">
-            <a:extLst>
-              <a:ext uri="{28A0092B-C50C-407E-A947-70E740481C1C}">
-                <a14:useLocalDpi xmlns:a14="http://schemas.microsoft.com/office/drawing/2010/main" val="0"/>
-              </a:ext>
-            </a:extLst>
-          </a:blip>
-          <a:srcRect/>
-          <a:stretch>
-            <a:fillRect/>
-          </a:stretch>
-        </p:blipFill>
-        <p:spPr bwMode="auto">
-          <a:xfrm>
-            <a:off x="3690120" y="-44658"/>
-            <a:ext cx="3267272" cy="8078733"/>
-          </a:xfrm>
-          <a:prstGeom prst="rect">
-            <a:avLst/>
-          </a:prstGeom>
-          <a:noFill/>
-          <a:ln>
-            <a:noFill/>
-          </a:ln>
-          <a:extLst>
-            <a:ext uri="{909E8E84-426E-40DD-AFC4-6F175D3DCCD1}">
-              <a14:hiddenFill xmlns:a14="http://schemas.microsoft.com/office/drawing/2010/main">
-                <a:solidFill>
-                  <a:schemeClr val="accent1"/>
-                </a:solidFill>
-              </a14:hiddenFill>
-            </a:ext>
-            <a:ext uri="{91240B29-F687-4F45-9708-019B960494DF}">
-              <a14:hiddenLine xmlns:a14="http://schemas.microsoft.com/office/drawing/2010/main" w="9525">
-                <a:solidFill>
-                  <a:schemeClr val="tx1"/>
-                </a:solidFill>
-                <a:miter lim="800000"/>
-                <a:headEnd/>
-                <a:tailEnd/>
-              </a14:hiddenLine>
-            </a:ext>
-          </a:extLst>
-        </p:spPr>
-      </p:pic>
-      <p:sp>
-        <p:nvSpPr>
-          <p:cNvPr id="80" name="ZoneTexte 79"/>
-          <p:cNvSpPr txBox="1"/>
-          <p:nvPr/>
-        </p:nvSpPr>
-        <p:spPr>
-          <a:xfrm>
-            <a:off x="4437112" y="234082"/>
-            <a:ext cx="447558" cy="369332"/>
-          </a:xfrm>
-          <a:prstGeom prst="rect">
-            <a:avLst/>
-          </a:prstGeom>
-          <a:noFill/>
-        </p:spPr>
-        <p:txBody>
-          <a:bodyPr wrap="none" rtlCol="0">
-            <a:spAutoFit/>
-          </a:bodyPr>
-          <a:lstStyle/>
-          <a:p>
-            <a:r>
-              <a:rPr lang="fr-FR" dirty="0" smtClean="0"/>
-              <a:t>(b)</a:t>
-            </a:r>
-            <a:endParaRPr lang="en-US" dirty="0"/>
-          </a:p>
-        </p:txBody>
-      </p:sp>
-      <p:pic>
-        <p:nvPicPr>
-          <p:cNvPr id="81" name="Picture 3"/>
+          <p:cNvPr id="63" name="Picture 3"/>
           <p:cNvPicPr>
             <a:picLocks noChangeAspect="1" noChangeArrowheads="1"/>
           </p:cNvPicPr>
@@ -3586,37 +3591,7 @@
       </p:pic>
       <p:sp>
         <p:nvSpPr>
-          <p:cNvPr id="82" name="ZoneTexte 81"/>
-          <p:cNvSpPr txBox="1"/>
-          <p:nvPr/>
-        </p:nvSpPr>
-        <p:spPr>
-          <a:xfrm>
-            <a:off x="1772816" y="212567"/>
-            <a:ext cx="436338" cy="369332"/>
-          </a:xfrm>
-          <a:prstGeom prst="rect">
-            <a:avLst/>
-          </a:prstGeom>
-          <a:noFill/>
-        </p:spPr>
-        <p:txBody>
-          <a:bodyPr wrap="none" rtlCol="0">
-            <a:spAutoFit/>
-          </a:bodyPr>
-          <a:lstStyle/>
-          <a:p>
-            <a:r>
-              <a:rPr lang="fr-FR" dirty="0" smtClean="0"/>
-              <a:t>(a)</a:t>
-            </a:r>
-            <a:endParaRPr lang="en-US" dirty="0"/>
-          </a:p>
-        </p:txBody>
-      </p:sp>
-      <p:sp>
-        <p:nvSpPr>
-          <p:cNvPr id="83" name="Text Box 14"/>
+          <p:cNvPr id="64" name="Text Box 14"/>
           <p:cNvSpPr txBox="1">
             <a:spLocks noChangeArrowheads="1"/>
           </p:cNvSpPr>
@@ -3801,7 +3776,7 @@
       </p:sp>
       <p:sp>
         <p:nvSpPr>
-          <p:cNvPr id="84" name="Text Box 14"/>
+          <p:cNvPr id="65" name="Text Box 14"/>
           <p:cNvSpPr txBox="1">
             <a:spLocks noChangeArrowheads="1"/>
           </p:cNvSpPr>
@@ -3809,7 +3784,7 @@
         </p:nvSpPr>
         <p:spPr bwMode="auto">
           <a:xfrm>
-            <a:off x="5224346" y="7702401"/>
+            <a:off x="1788325" y="7712461"/>
             <a:ext cx="776579" cy="307777"/>
           </a:xfrm>
           <a:prstGeom prst="rect">
@@ -3961,16 +3936,16 @@
               </a:buClr>
             </a:pPr>
             <a:r>
-              <a:rPr lang="en-US" sz="1400" b="1" dirty="0" smtClean="0">
+              <a:rPr lang="en-US" sz="1400" b="1" dirty="0" err="1" smtClean="0">
                 <a:latin typeface="Times New Roman" pitchFamily="18" charset="0"/>
               </a:rPr>
               <a:t>B</a:t>
             </a:r>
             <a:r>
-              <a:rPr lang="en-US" sz="1400" b="1" baseline="-25000" dirty="0" smtClean="0">
+              <a:rPr lang="en-US" sz="1400" b="1" baseline="-25000" dirty="0" err="1">
                 <a:latin typeface="Times New Roman" pitchFamily="18" charset="0"/>
               </a:rPr>
-              <a:t>┴</a:t>
+              <a:t>z</a:t>
             </a:r>
             <a:r>
               <a:rPr lang="en-US" sz="1400" b="1" dirty="0" smtClean="0">
@@ -3986,7 +3961,7 @@
       </p:sp>
       <p:sp>
         <p:nvSpPr>
-          <p:cNvPr id="85" name="Text Box 14"/>
+          <p:cNvPr id="66" name="Text Box 14"/>
           <p:cNvSpPr txBox="1">
             <a:spLocks noChangeArrowheads="1"/>
           </p:cNvSpPr>
@@ -3994,7 +3969,7 @@
         </p:nvSpPr>
         <p:spPr bwMode="auto">
           <a:xfrm>
-            <a:off x="1788325" y="7712461"/>
+            <a:off x="-38342" y="1678549"/>
             <a:ext cx="776579" cy="307777"/>
           </a:xfrm>
           <a:prstGeom prst="rect">
@@ -4146,22 +4121,10 @@
               </a:buClr>
             </a:pPr>
             <a:r>
-              <a:rPr lang="en-US" sz="1400" b="1" dirty="0" err="1" smtClean="0">
-                <a:latin typeface="Times New Roman" pitchFamily="18" charset="0"/>
-              </a:rPr>
-              <a:t>B</a:t>
-            </a:r>
-            <a:r>
-              <a:rPr lang="en-US" sz="1400" b="1" baseline="-25000" dirty="0" err="1">
-                <a:latin typeface="Times New Roman" pitchFamily="18" charset="0"/>
-              </a:rPr>
-              <a:t>z</a:t>
-            </a:r>
-            <a:r>
               <a:rPr lang="en-US" sz="1400" b="1" dirty="0" smtClean="0">
                 <a:latin typeface="Times New Roman" pitchFamily="18" charset="0"/>
               </a:rPr>
-              <a:t>(T)</a:t>
+              <a:t>M=2</a:t>
             </a:r>
             <a:endParaRPr lang="en-US" sz="1400" b="1" dirty="0">
               <a:latin typeface="Times New Roman" pitchFamily="18" charset="0"/>
@@ -4171,55 +4134,7 @@
       </p:sp>
       <p:sp>
         <p:nvSpPr>
-          <p:cNvPr id="86" name="Rectangle 85"/>
-          <p:cNvSpPr/>
-          <p:nvPr/>
-        </p:nvSpPr>
-        <p:spPr>
-          <a:xfrm>
-            <a:off x="858162" y="8426518"/>
-            <a:ext cx="72008" cy="160492"/>
-          </a:xfrm>
-          <a:prstGeom prst="rect">
-            <a:avLst/>
-          </a:prstGeom>
-          <a:solidFill>
-            <a:schemeClr val="bg1"/>
-          </a:solidFill>
-          <a:ln>
-            <a:solidFill>
-              <a:schemeClr val="bg1"/>
-            </a:solidFill>
-          </a:ln>
-        </p:spPr>
-        <p:style>
-          <a:lnRef idx="2">
-            <a:schemeClr val="accent1">
-              <a:shade val="50000"/>
-            </a:schemeClr>
-          </a:lnRef>
-          <a:fillRef idx="1">
-            <a:schemeClr val="accent1"/>
-          </a:fillRef>
-          <a:effectRef idx="0">
-            <a:schemeClr val="accent1"/>
-          </a:effectRef>
-          <a:fontRef idx="minor">
-            <a:schemeClr val="lt1"/>
-          </a:fontRef>
-        </p:style>
-        <p:txBody>
-          <a:bodyPr rtlCol="0" anchor="ctr"/>
-          <a:lstStyle/>
-          <a:p>
-            <a:pPr algn="ctr"/>
-            <a:endParaRPr lang="en-US"/>
-          </a:p>
-        </p:txBody>
-      </p:sp>
-      <p:sp>
-        <p:nvSpPr>
-          <p:cNvPr id="87" name="Text Box 14"/>
+          <p:cNvPr id="67" name="Text Box 14"/>
           <p:cNvSpPr txBox="1">
             <a:spLocks noChangeArrowheads="1"/>
           </p:cNvSpPr>
@@ -4227,7 +4142,7 @@
         </p:nvSpPr>
         <p:spPr bwMode="auto">
           <a:xfrm>
-            <a:off x="-83883" y="1678549"/>
+            <a:off x="564189" y="655677"/>
             <a:ext cx="776579" cy="307777"/>
           </a:xfrm>
           <a:prstGeom prst="rect">
@@ -4379,10 +4294,22 @@
               </a:buClr>
             </a:pPr>
             <a:r>
+              <a:rPr lang="en-US" sz="1400" b="1" dirty="0" err="1" smtClean="0">
+                <a:latin typeface="Times New Roman" pitchFamily="18" charset="0"/>
+              </a:rPr>
+              <a:t>M</a:t>
+            </a:r>
+            <a:r>
+              <a:rPr lang="en-US" sz="1400" b="1" baseline="-25000" dirty="0" err="1" smtClean="0">
+                <a:latin typeface="Times New Roman" pitchFamily="18" charset="0"/>
+              </a:rPr>
+              <a:t>z</a:t>
+            </a:r>
+            <a:r>
               <a:rPr lang="en-US" sz="1400" b="1" dirty="0" smtClean="0">
                 <a:latin typeface="Times New Roman" pitchFamily="18" charset="0"/>
               </a:rPr>
-              <a:t>M=2</a:t>
+              <a:t>=0</a:t>
             </a:r>
             <a:endParaRPr lang="en-US" sz="1400" b="1" dirty="0">
               <a:latin typeface="Times New Roman" pitchFamily="18" charset="0"/>
@@ -4392,7 +4319,7 @@
       </p:sp>
       <p:sp>
         <p:nvSpPr>
-          <p:cNvPr id="88" name="Text Box 14"/>
+          <p:cNvPr id="68" name="Text Box 14"/>
           <p:cNvSpPr txBox="1">
             <a:spLocks noChangeArrowheads="1"/>
           </p:cNvSpPr>
@@ -4400,7 +4327,7 @@
         </p:nvSpPr>
         <p:spPr bwMode="auto">
           <a:xfrm>
-            <a:off x="564189" y="655677"/>
+            <a:off x="564189" y="1073861"/>
             <a:ext cx="776579" cy="307777"/>
           </a:xfrm>
           <a:prstGeom prst="rect">
@@ -4567,7 +4494,7 @@
               <a:rPr lang="en-US" sz="1400" b="1" dirty="0" smtClean="0">
                 <a:latin typeface="Times New Roman" pitchFamily="18" charset="0"/>
               </a:rPr>
-              <a:t>=0</a:t>
+              <a:t>=±1</a:t>
             </a:r>
             <a:endParaRPr lang="en-US" sz="1400" b="1" dirty="0">
               <a:latin typeface="Times New Roman" pitchFamily="18" charset="0"/>
@@ -4577,7 +4504,7 @@
       </p:sp>
       <p:sp>
         <p:nvSpPr>
-          <p:cNvPr id="89" name="Text Box 14"/>
+          <p:cNvPr id="69" name="Text Box 14"/>
           <p:cNvSpPr txBox="1">
             <a:spLocks noChangeArrowheads="1"/>
           </p:cNvSpPr>
@@ -4585,7 +4512,7 @@
         </p:nvSpPr>
         <p:spPr bwMode="auto">
           <a:xfrm>
-            <a:off x="564189" y="1073861"/>
+            <a:off x="548680" y="2331606"/>
             <a:ext cx="776579" cy="307777"/>
           </a:xfrm>
           <a:prstGeom prst="rect">
@@ -4752,191 +4679,6 @@
               <a:rPr lang="en-US" sz="1400" b="1" dirty="0" smtClean="0">
                 <a:latin typeface="Times New Roman" pitchFamily="18" charset="0"/>
               </a:rPr>
-              <a:t>=±1</a:t>
-            </a:r>
-            <a:endParaRPr lang="en-US" sz="1400" b="1" dirty="0">
-              <a:latin typeface="Times New Roman" pitchFamily="18" charset="0"/>
-            </a:endParaRPr>
-          </a:p>
-        </p:txBody>
-      </p:sp>
-      <p:sp>
-        <p:nvSpPr>
-          <p:cNvPr id="90" name="Text Box 14"/>
-          <p:cNvSpPr txBox="1">
-            <a:spLocks noChangeArrowheads="1"/>
-          </p:cNvSpPr>
-          <p:nvPr/>
-        </p:nvSpPr>
-        <p:spPr bwMode="auto">
-          <a:xfrm>
-            <a:off x="548680" y="2331606"/>
-            <a:ext cx="776579" cy="307777"/>
-          </a:xfrm>
-          <a:prstGeom prst="rect">
-            <a:avLst/>
-          </a:prstGeom>
-          <a:noFill/>
-          <a:ln>
-            <a:noFill/>
-          </a:ln>
-          <a:effectLst/>
-          <a:extLst>
-            <a:ext uri="{909E8E84-426E-40DD-AFC4-6F175D3DCCD1}">
-              <a14:hiddenFill xmlns:a14="http://schemas.microsoft.com/office/drawing/2010/main">
-                <a:solidFill>
-                  <a:schemeClr val="accent1"/>
-                </a:solidFill>
-              </a14:hiddenFill>
-            </a:ext>
-            <a:ext uri="{91240B29-F687-4F45-9708-019B960494DF}">
-              <a14:hiddenLine xmlns:a14="http://schemas.microsoft.com/office/drawing/2010/main" w="9525">
-                <a:solidFill>
-                  <a:srgbClr val="0000FF"/>
-                </a:solidFill>
-                <a:miter lim="800000"/>
-                <a:headEnd/>
-                <a:tailEnd/>
-              </a14:hiddenLine>
-            </a:ext>
-            <a:ext uri="{AF507438-7753-43E0-B8FC-AC1667EBCBE1}">
-              <a14:hiddenEffects xmlns:a14="http://schemas.microsoft.com/office/drawing/2010/main">
-                <a:effectLst>
-                  <a:outerShdw dist="35921" dir="2700000" algn="ctr" rotWithShape="0">
-                    <a:schemeClr val="bg2"/>
-                  </a:outerShdw>
-                </a:effectLst>
-              </a14:hiddenEffects>
-            </a:ext>
-          </a:extLst>
-        </p:spPr>
-        <p:txBody>
-          <a:bodyPr wrap="square">
-            <a:spAutoFit/>
-          </a:bodyPr>
-          <a:lstStyle>
-            <a:lvl1pPr>
-              <a:defRPr>
-                <a:solidFill>
-                  <a:schemeClr val="tx1"/>
-                </a:solidFill>
-                <a:latin typeface="Arial" charset="0"/>
-              </a:defRPr>
-            </a:lvl1pPr>
-            <a:lvl2pPr marL="742950" indent="-285750">
-              <a:defRPr>
-                <a:solidFill>
-                  <a:schemeClr val="tx1"/>
-                </a:solidFill>
-                <a:latin typeface="Arial" charset="0"/>
-              </a:defRPr>
-            </a:lvl2pPr>
-            <a:lvl3pPr>
-              <a:defRPr>
-                <a:solidFill>
-                  <a:schemeClr val="tx1"/>
-                </a:solidFill>
-                <a:latin typeface="Arial" charset="0"/>
-              </a:defRPr>
-            </a:lvl3pPr>
-            <a:lvl4pPr marL="1600200" indent="-228600">
-              <a:defRPr>
-                <a:solidFill>
-                  <a:schemeClr val="tx1"/>
-                </a:solidFill>
-                <a:latin typeface="Arial" charset="0"/>
-              </a:defRPr>
-            </a:lvl4pPr>
-            <a:lvl5pPr marL="2057400" indent="-228600">
-              <a:defRPr>
-                <a:solidFill>
-                  <a:schemeClr val="tx1"/>
-                </a:solidFill>
-                <a:latin typeface="Arial" charset="0"/>
-              </a:defRPr>
-            </a:lvl5pPr>
-            <a:lvl6pPr marL="2514600" indent="-228600" fontAlgn="base">
-              <a:spcBef>
-                <a:spcPct val="0"/>
-              </a:spcBef>
-              <a:spcAft>
-                <a:spcPct val="0"/>
-              </a:spcAft>
-              <a:defRPr>
-                <a:solidFill>
-                  <a:schemeClr val="tx1"/>
-                </a:solidFill>
-                <a:latin typeface="Arial" charset="0"/>
-              </a:defRPr>
-            </a:lvl6pPr>
-            <a:lvl7pPr marL="2971800" indent="-228600" fontAlgn="base">
-              <a:spcBef>
-                <a:spcPct val="0"/>
-              </a:spcBef>
-              <a:spcAft>
-                <a:spcPct val="0"/>
-              </a:spcAft>
-              <a:defRPr>
-                <a:solidFill>
-                  <a:schemeClr val="tx1"/>
-                </a:solidFill>
-                <a:latin typeface="Arial" charset="0"/>
-              </a:defRPr>
-            </a:lvl7pPr>
-            <a:lvl8pPr marL="3429000" indent="-228600" fontAlgn="base">
-              <a:spcBef>
-                <a:spcPct val="0"/>
-              </a:spcBef>
-              <a:spcAft>
-                <a:spcPct val="0"/>
-              </a:spcAft>
-              <a:defRPr>
-                <a:solidFill>
-                  <a:schemeClr val="tx1"/>
-                </a:solidFill>
-                <a:latin typeface="Arial" charset="0"/>
-              </a:defRPr>
-            </a:lvl8pPr>
-            <a:lvl9pPr marL="3886200" indent="-228600" fontAlgn="base">
-              <a:spcBef>
-                <a:spcPct val="0"/>
-              </a:spcBef>
-              <a:spcAft>
-                <a:spcPct val="0"/>
-              </a:spcAft>
-              <a:defRPr>
-                <a:solidFill>
-                  <a:schemeClr val="tx1"/>
-                </a:solidFill>
-                <a:latin typeface="Arial" charset="0"/>
-              </a:defRPr>
-            </a:lvl9pPr>
-          </a:lstStyle>
-          <a:p>
-            <a:pPr>
-              <a:spcBef>
-                <a:spcPct val="50000"/>
-              </a:spcBef>
-              <a:buClr>
-                <a:schemeClr val="accent2"/>
-              </a:buClr>
-            </a:pPr>
-            <a:r>
-              <a:rPr lang="en-US" sz="1400" b="1" dirty="0" err="1" smtClean="0">
-                <a:latin typeface="Times New Roman" pitchFamily="18" charset="0"/>
-              </a:rPr>
-              <a:t>M</a:t>
-            </a:r>
-            <a:r>
-              <a:rPr lang="en-US" sz="1400" b="1" baseline="-25000" dirty="0" err="1" smtClean="0">
-                <a:latin typeface="Times New Roman" pitchFamily="18" charset="0"/>
-              </a:rPr>
-              <a:t>z</a:t>
-            </a:r>
-            <a:r>
-              <a:rPr lang="en-US" sz="1400" b="1" dirty="0" smtClean="0">
-                <a:latin typeface="Times New Roman" pitchFamily="18" charset="0"/>
-              </a:rPr>
               <a:t>=±</a:t>
             </a:r>
             <a:r>
@@ -4950,7 +4692,7 @@
       </p:sp>
       <p:sp>
         <p:nvSpPr>
-          <p:cNvPr id="91" name="Accolade ouvrante 90"/>
+          <p:cNvPr id="70" name="Accolade ouvrante 69"/>
           <p:cNvSpPr/>
           <p:nvPr/>
         </p:nvSpPr>
@@ -4988,7 +4730,7 @@
       </p:sp>
       <p:sp>
         <p:nvSpPr>
-          <p:cNvPr id="92" name="Text Box 14"/>
+          <p:cNvPr id="71" name="Text Box 14"/>
           <p:cNvSpPr txBox="1">
             <a:spLocks noChangeArrowheads="1"/>
           </p:cNvSpPr>
@@ -4996,7 +4738,7 @@
         </p:nvSpPr>
         <p:spPr bwMode="auto">
           <a:xfrm>
-            <a:off x="-99392" y="5427950"/>
+            <a:off x="-53851" y="5427950"/>
             <a:ext cx="776579" cy="307777"/>
           </a:xfrm>
           <a:prstGeom prst="rect">
@@ -5161,7 +4903,7 @@
       </p:sp>
       <p:sp>
         <p:nvSpPr>
-          <p:cNvPr id="93" name="Text Box 14"/>
+          <p:cNvPr id="72" name="Text Box 14"/>
           <p:cNvSpPr txBox="1">
             <a:spLocks noChangeArrowheads="1"/>
           </p:cNvSpPr>
@@ -5346,7 +5088,7 @@
       </p:sp>
       <p:sp>
         <p:nvSpPr>
-          <p:cNvPr id="94" name="Text Box 14"/>
+          <p:cNvPr id="73" name="Text Box 14"/>
           <p:cNvSpPr txBox="1">
             <a:spLocks noChangeArrowheads="1"/>
           </p:cNvSpPr>
@@ -5531,7 +5273,7 @@
       </p:sp>
       <p:sp>
         <p:nvSpPr>
-          <p:cNvPr id="95" name="Text Box 14"/>
+          <p:cNvPr id="74" name="Text Box 14"/>
           <p:cNvSpPr txBox="1">
             <a:spLocks noChangeArrowheads="1"/>
           </p:cNvSpPr>
@@ -5719,7 +5461,7 @@
       </p:sp>
       <p:sp>
         <p:nvSpPr>
-          <p:cNvPr id="96" name="Accolade ouvrante 95"/>
+          <p:cNvPr id="75" name="Accolade ouvrante 74"/>
           <p:cNvSpPr/>
           <p:nvPr/>
         </p:nvSpPr>
@@ -5757,7 +5499,7 @@
       </p:sp>
       <p:sp>
         <p:nvSpPr>
-          <p:cNvPr id="97" name="Text Box 14"/>
+          <p:cNvPr id="76" name="Text Box 14"/>
           <p:cNvSpPr txBox="1">
             <a:spLocks noChangeArrowheads="1"/>
           </p:cNvSpPr>

</xml_diff>